<commit_message>
fix: day two has missing exercises
</commit_message>
<xml_diff>
--- a/exercises/Paper Flow.pptx
+++ b/exercises/Paper Flow.pptx
@@ -6,10 +6,13 @@
   </p:sldMasterIdLst>
   <p:sldIdLst>
     <p:sldId id="256" r:id="rId2"/>
-    <p:sldId id="257" r:id="rId3"/>
-    <p:sldId id="258" r:id="rId4"/>
-    <p:sldId id="259" r:id="rId5"/>
-    <p:sldId id="260" r:id="rId6"/>
+    <p:sldId id="261" r:id="rId3"/>
+    <p:sldId id="257" r:id="rId4"/>
+    <p:sldId id="262" r:id="rId5"/>
+    <p:sldId id="258" r:id="rId6"/>
+    <p:sldId id="259" r:id="rId7"/>
+    <p:sldId id="260" r:id="rId8"/>
+    <p:sldId id="263" r:id="rId9"/>
   </p:sldIdLst>
   <p:sldSz cx="12192000" cy="6858000"/>
   <p:notesSz cx="6858000" cy="9144000"/>
@@ -263,7 +266,7 @@
           <a:p>
             <a:fld id="{A0F93794-A7D6-114D-A0A0-A74EA76A7C4E}" type="datetimeFigureOut">
               <a:rPr lang="en-GB" smtClean="0"/>
-              <a:t>10/06/2024</a:t>
+              <a:t>11/06/2024</a:t>
             </a:fld>
             <a:endParaRPr lang="en-GB"/>
           </a:p>
@@ -461,7 +464,7 @@
           <a:p>
             <a:fld id="{A0F93794-A7D6-114D-A0A0-A74EA76A7C4E}" type="datetimeFigureOut">
               <a:rPr lang="en-GB" smtClean="0"/>
-              <a:t>10/06/2024</a:t>
+              <a:t>11/06/2024</a:t>
             </a:fld>
             <a:endParaRPr lang="en-GB"/>
           </a:p>
@@ -669,7 +672,7 @@
           <a:p>
             <a:fld id="{A0F93794-A7D6-114D-A0A0-A74EA76A7C4E}" type="datetimeFigureOut">
               <a:rPr lang="en-GB" smtClean="0"/>
-              <a:t>10/06/2024</a:t>
+              <a:t>11/06/2024</a:t>
             </a:fld>
             <a:endParaRPr lang="en-GB"/>
           </a:p>
@@ -867,7 +870,7 @@
           <a:p>
             <a:fld id="{A0F93794-A7D6-114D-A0A0-A74EA76A7C4E}" type="datetimeFigureOut">
               <a:rPr lang="en-GB" smtClean="0"/>
-              <a:t>10/06/2024</a:t>
+              <a:t>11/06/2024</a:t>
             </a:fld>
             <a:endParaRPr lang="en-GB"/>
           </a:p>
@@ -1142,7 +1145,7 @@
           <a:p>
             <a:fld id="{A0F93794-A7D6-114D-A0A0-A74EA76A7C4E}" type="datetimeFigureOut">
               <a:rPr lang="en-GB" smtClean="0"/>
-              <a:t>10/06/2024</a:t>
+              <a:t>11/06/2024</a:t>
             </a:fld>
             <a:endParaRPr lang="en-GB"/>
           </a:p>
@@ -1407,7 +1410,7 @@
           <a:p>
             <a:fld id="{A0F93794-A7D6-114D-A0A0-A74EA76A7C4E}" type="datetimeFigureOut">
               <a:rPr lang="en-GB" smtClean="0"/>
-              <a:t>10/06/2024</a:t>
+              <a:t>11/06/2024</a:t>
             </a:fld>
             <a:endParaRPr lang="en-GB"/>
           </a:p>
@@ -1819,7 +1822,7 @@
           <a:p>
             <a:fld id="{A0F93794-A7D6-114D-A0A0-A74EA76A7C4E}" type="datetimeFigureOut">
               <a:rPr lang="en-GB" smtClean="0"/>
-              <a:t>10/06/2024</a:t>
+              <a:t>11/06/2024</a:t>
             </a:fld>
             <a:endParaRPr lang="en-GB"/>
           </a:p>
@@ -1960,7 +1963,7 @@
           <a:p>
             <a:fld id="{A0F93794-A7D6-114D-A0A0-A74EA76A7C4E}" type="datetimeFigureOut">
               <a:rPr lang="en-GB" smtClean="0"/>
-              <a:t>10/06/2024</a:t>
+              <a:t>11/06/2024</a:t>
             </a:fld>
             <a:endParaRPr lang="en-GB"/>
           </a:p>
@@ -2073,7 +2076,7 @@
           <a:p>
             <a:fld id="{A0F93794-A7D6-114D-A0A0-A74EA76A7C4E}" type="datetimeFigureOut">
               <a:rPr lang="en-GB" smtClean="0"/>
-              <a:t>10/06/2024</a:t>
+              <a:t>11/06/2024</a:t>
             </a:fld>
             <a:endParaRPr lang="en-GB"/>
           </a:p>
@@ -2384,7 +2387,7 @@
           <a:p>
             <a:fld id="{A0F93794-A7D6-114D-A0A0-A74EA76A7C4E}" type="datetimeFigureOut">
               <a:rPr lang="en-GB" smtClean="0"/>
-              <a:t>10/06/2024</a:t>
+              <a:t>11/06/2024</a:t>
             </a:fld>
             <a:endParaRPr lang="en-GB"/>
           </a:p>
@@ -2672,7 +2675,7 @@
           <a:p>
             <a:fld id="{A0F93794-A7D6-114D-A0A0-A74EA76A7C4E}" type="datetimeFigureOut">
               <a:rPr lang="en-GB" smtClean="0"/>
-              <a:t>10/06/2024</a:t>
+              <a:t>11/06/2024</a:t>
             </a:fld>
             <a:endParaRPr lang="en-GB"/>
           </a:p>
@@ -2913,7 +2916,7 @@
           <a:p>
             <a:fld id="{A0F93794-A7D6-114D-A0A0-A74EA76A7C4E}" type="datetimeFigureOut">
               <a:rPr lang="en-GB" smtClean="0"/>
-              <a:t>10/06/2024</a:t>
+              <a:t>11/06/2024</a:t>
             </a:fld>
             <a:endParaRPr lang="en-GB"/>
           </a:p>
@@ -3402,6 +3405,120 @@
 <file path=ppt/slides/slide2.xml><?xml version="1.0" encoding="utf-8"?>
 <p:sld xmlns:a="http://schemas.openxmlformats.org/drawingml/2006/main" xmlns:r="http://schemas.openxmlformats.org/officeDocument/2006/relationships" xmlns:p="http://schemas.openxmlformats.org/presentationml/2006/main">
   <p:cSld>
+    <p:spTree>
+      <p:nvGrpSpPr>
+        <p:cNvPr id="1" name=""/>
+        <p:cNvGrpSpPr/>
+        <p:nvPr/>
+      </p:nvGrpSpPr>
+      <p:grpSpPr>
+        <a:xfrm>
+          <a:off x="0" y="0"/>
+          <a:ext cx="0" cy="0"/>
+          <a:chOff x="0" y="0"/>
+          <a:chExt cx="0" cy="0"/>
+        </a:xfrm>
+      </p:grpSpPr>
+      <p:sp>
+        <p:nvSpPr>
+          <p:cNvPr id="2" name="Title 1">
+            <a:extLst>
+              <a:ext uri="{FF2B5EF4-FFF2-40B4-BE49-F238E27FC236}">
+                <a16:creationId xmlns:a16="http://schemas.microsoft.com/office/drawing/2014/main" id="{FF65E1A8-624A-201C-7B77-2ACA62051C83}"/>
+              </a:ext>
+            </a:extLst>
+          </p:cNvPr>
+          <p:cNvSpPr>
+            <a:spLocks noGrp="1"/>
+          </p:cNvSpPr>
+          <p:nvPr>
+            <p:ph type="title"/>
+          </p:nvPr>
+        </p:nvSpPr>
+        <p:spPr/>
+        <p:txBody>
+          <a:bodyPr/>
+          <a:lstStyle/>
+          <a:p>
+            <a:r>
+              <a:rPr lang="en-GB" dirty="0"/>
+              <a:t>Create a Paper Flow</a:t>
+            </a:r>
+          </a:p>
+        </p:txBody>
+      </p:sp>
+      <p:sp>
+        <p:nvSpPr>
+          <p:cNvPr id="3" name="Content Placeholder 2">
+            <a:extLst>
+              <a:ext uri="{FF2B5EF4-FFF2-40B4-BE49-F238E27FC236}">
+                <a16:creationId xmlns:a16="http://schemas.microsoft.com/office/drawing/2014/main" id="{E7652786-E9AE-56EB-AE90-95A87636056F}"/>
+              </a:ext>
+            </a:extLst>
+          </p:cNvPr>
+          <p:cNvSpPr>
+            <a:spLocks noGrp="1"/>
+          </p:cNvSpPr>
+          <p:nvPr>
+            <p:ph idx="1"/>
+          </p:nvPr>
+        </p:nvSpPr>
+        <p:spPr/>
+        <p:txBody>
+          <a:bodyPr/>
+          <a:lstStyle/>
+          <a:p>
+            <a:r>
+              <a:rPr lang="en-GB" dirty="0"/>
+              <a:t>Our goal here is to create a paper flow for a process</a:t>
+            </a:r>
+          </a:p>
+          <a:p>
+            <a:pPr lvl="1"/>
+            <a:r>
+              <a:rPr lang="en-GB" dirty="0"/>
+              <a:t>Then we can use that paper process to think about how we could partition our system</a:t>
+            </a:r>
+          </a:p>
+          <a:p>
+            <a:pPr lvl="1"/>
+            <a:r>
+              <a:rPr lang="en-GB" dirty="0"/>
+              <a:t>Team Topologies calls these points “fracture planes”</a:t>
+            </a:r>
+          </a:p>
+          <a:p>
+            <a:pPr lvl="1"/>
+            <a:r>
+              <a:rPr lang="en-GB" dirty="0"/>
+              <a:t>For an event driven architecture, fracture planes around “hand offs”, inbox to outbox help us build a robust system</a:t>
+            </a:r>
+          </a:p>
+          <a:p>
+            <a:pPr lvl="1"/>
+            <a:r>
+              <a:rPr lang="en-GB" dirty="0"/>
+              <a:t>”ACID” transactions take place at a desk; “BASE” takes place across desks</a:t>
+            </a:r>
+          </a:p>
+        </p:txBody>
+      </p:sp>
+    </p:spTree>
+    <p:extLst>
+      <p:ext uri="{BB962C8B-B14F-4D97-AF65-F5344CB8AC3E}">
+        <p14:creationId xmlns:p14="http://schemas.microsoft.com/office/powerpoint/2010/main" val="684595859"/>
+      </p:ext>
+    </p:extLst>
+  </p:cSld>
+  <p:clrMapOvr>
+    <a:masterClrMapping/>
+  </p:clrMapOvr>
+</p:sld>
+</file>
+
+<file path=ppt/slides/slide3.xml><?xml version="1.0" encoding="utf-8"?>
+<p:sld xmlns:a="http://schemas.openxmlformats.org/drawingml/2006/main" xmlns:r="http://schemas.openxmlformats.org/officeDocument/2006/relationships" xmlns:p="http://schemas.openxmlformats.org/presentationml/2006/main">
+  <p:cSld>
     <p:bg>
       <p:bgPr>
         <a:solidFill>
@@ -3483,7 +3600,183 @@
 </p:sld>
 </file>
 
-<file path=ppt/slides/slide3.xml><?xml version="1.0" encoding="utf-8"?>
+<file path=ppt/slides/slide4.xml><?xml version="1.0" encoding="utf-8"?>
+<p:sld xmlns:a="http://schemas.openxmlformats.org/drawingml/2006/main" xmlns:r="http://schemas.openxmlformats.org/officeDocument/2006/relationships" xmlns:p="http://schemas.openxmlformats.org/presentationml/2006/main">
+  <p:cSld>
+    <p:spTree>
+      <p:nvGrpSpPr>
+        <p:cNvPr id="1" name=""/>
+        <p:cNvGrpSpPr/>
+        <p:nvPr/>
+      </p:nvGrpSpPr>
+      <p:grpSpPr>
+        <a:xfrm>
+          <a:off x="0" y="0"/>
+          <a:ext cx="0" cy="0"/>
+          <a:chOff x="0" y="0"/>
+          <a:chExt cx="0" cy="0"/>
+        </a:xfrm>
+      </p:grpSpPr>
+      <p:sp>
+        <p:nvSpPr>
+          <p:cNvPr id="2" name="Title 1">
+            <a:extLst>
+              <a:ext uri="{FF2B5EF4-FFF2-40B4-BE49-F238E27FC236}">
+                <a16:creationId xmlns:a16="http://schemas.microsoft.com/office/drawing/2014/main" id="{FF65E1A8-624A-201C-7B77-2ACA62051C83}"/>
+              </a:ext>
+            </a:extLst>
+          </p:cNvPr>
+          <p:cNvSpPr>
+            <a:spLocks noGrp="1"/>
+          </p:cNvSpPr>
+          <p:nvPr>
+            <p:ph type="title"/>
+          </p:nvPr>
+        </p:nvSpPr>
+        <p:spPr/>
+        <p:txBody>
+          <a:bodyPr/>
+          <a:lstStyle/>
+          <a:p>
+            <a:r>
+              <a:rPr lang="en-GB" dirty="0"/>
+              <a:t>Pick One Step and Model As A Paper Flow</a:t>
+            </a:r>
+          </a:p>
+        </p:txBody>
+      </p:sp>
+      <p:sp>
+        <p:nvSpPr>
+          <p:cNvPr id="3" name="Content Placeholder 2">
+            <a:extLst>
+              <a:ext uri="{FF2B5EF4-FFF2-40B4-BE49-F238E27FC236}">
+                <a16:creationId xmlns:a16="http://schemas.microsoft.com/office/drawing/2014/main" id="{E7652786-E9AE-56EB-AE90-95A87636056F}"/>
+              </a:ext>
+            </a:extLst>
+          </p:cNvPr>
+          <p:cNvSpPr>
+            <a:spLocks noGrp="1"/>
+          </p:cNvSpPr>
+          <p:nvPr>
+            <p:ph idx="1"/>
+          </p:nvPr>
+        </p:nvSpPr>
+        <p:spPr/>
+        <p:txBody>
+          <a:bodyPr>
+            <a:normAutofit fontScale="85000" lnSpcReduction="20000"/>
+          </a:bodyPr>
+          <a:lstStyle/>
+          <a:p>
+            <a:r>
+              <a:rPr lang="en-GB" dirty="0"/>
+              <a:t>Onboarding a Hotel is another Step we can model</a:t>
+            </a:r>
+          </a:p>
+          <a:p>
+            <a:pPr lvl="1"/>
+            <a:r>
+              <a:rPr lang="en-GB" dirty="0"/>
+              <a:t>How do we get hotels into our catalogue?</a:t>
+            </a:r>
+          </a:p>
+          <a:p>
+            <a:r>
+              <a:rPr lang="en-GB" dirty="0"/>
+              <a:t>Pre-Arrival and Arrival</a:t>
+            </a:r>
+          </a:p>
+          <a:p>
+            <a:pPr lvl="1"/>
+            <a:r>
+              <a:rPr lang="en-GB" dirty="0"/>
+              <a:t>Pre-Arrival is booking a stay</a:t>
+            </a:r>
+          </a:p>
+          <a:p>
+            <a:pPr lvl="1"/>
+            <a:r>
+              <a:rPr lang="en-GB" dirty="0"/>
+              <a:t>Arrival is check-in at the desk</a:t>
+            </a:r>
+          </a:p>
+          <a:p>
+            <a:pPr lvl="1"/>
+            <a:r>
+              <a:rPr lang="en-GB" dirty="0"/>
+              <a:t>You can make assumptions about outputs of prior steps</a:t>
+            </a:r>
+          </a:p>
+          <a:p>
+            <a:pPr lvl="2"/>
+            <a:r>
+              <a:rPr lang="en-GB" dirty="0"/>
+              <a:t>Onboarding: A catalogue of hotels</a:t>
+            </a:r>
+          </a:p>
+          <a:p>
+            <a:pPr lvl="2"/>
+            <a:r>
+              <a:rPr lang="en-GB" dirty="0"/>
+              <a:t>Pre-Arrival: A booking</a:t>
+            </a:r>
+          </a:p>
+          <a:p>
+            <a:pPr lvl="2"/>
+            <a:r>
+              <a:rPr lang="en-GB" dirty="0"/>
+              <a:t>Arrival: A Key</a:t>
+            </a:r>
+          </a:p>
+          <a:p>
+            <a:r>
+              <a:rPr lang="en-GB" dirty="0"/>
+              <a:t>Occupancy is less obvious</a:t>
+            </a:r>
+          </a:p>
+          <a:p>
+            <a:pPr lvl="1"/>
+            <a:r>
+              <a:rPr lang="en-GB" dirty="0"/>
+              <a:t>Try: making a purchase from Room Service</a:t>
+            </a:r>
+          </a:p>
+          <a:p>
+            <a:pPr lvl="2"/>
+            <a:r>
+              <a:rPr lang="en-GB" dirty="0"/>
+              <a:t>Assume a Room Service Menu</a:t>
+            </a:r>
+          </a:p>
+          <a:p>
+            <a:r>
+              <a:rPr lang="en-GB" dirty="0"/>
+              <a:t>Departure is how I get my bill</a:t>
+            </a:r>
+          </a:p>
+          <a:p>
+            <a:pPr lvl="1"/>
+            <a:r>
+              <a:rPr lang="en-GB" dirty="0"/>
+              <a:t>Show how the flow of bills reaches my file</a:t>
+            </a:r>
+          </a:p>
+        </p:txBody>
+      </p:sp>
+    </p:spTree>
+    <p:extLst>
+      <p:ext uri="{BB962C8B-B14F-4D97-AF65-F5344CB8AC3E}">
+        <p14:creationId xmlns:p14="http://schemas.microsoft.com/office/powerpoint/2010/main" val="2082356654"/>
+      </p:ext>
+    </p:extLst>
+  </p:cSld>
+  <p:clrMapOvr>
+    <a:masterClrMapping/>
+  </p:clrMapOvr>
+</p:sld>
+</file>
+
+<file path=ppt/slides/slide5.xml><?xml version="1.0" encoding="utf-8"?>
 <p:sld xmlns:a="http://schemas.openxmlformats.org/drawingml/2006/main" xmlns:r="http://schemas.openxmlformats.org/officeDocument/2006/relationships" xmlns:p="http://schemas.openxmlformats.org/presentationml/2006/main">
   <p:cSld>
     <p:spTree>
@@ -3543,7 +3836,7 @@
 </p:sld>
 </file>
 
-<file path=ppt/slides/slide4.xml><?xml version="1.0" encoding="utf-8"?>
+<file path=ppt/slides/slide6.xml><?xml version="1.0" encoding="utf-8"?>
 <p:sld xmlns:a="http://schemas.openxmlformats.org/drawingml/2006/main" xmlns:r="http://schemas.openxmlformats.org/officeDocument/2006/relationships" xmlns:p="http://schemas.openxmlformats.org/presentationml/2006/main">
   <p:cSld>
     <p:bg>
@@ -3611,7 +3904,7 @@
 </p:sld>
 </file>
 
-<file path=ppt/slides/slide5.xml><?xml version="1.0" encoding="utf-8"?>
+<file path=ppt/slides/slide7.xml><?xml version="1.0" encoding="utf-8"?>
 <p:sld xmlns:a="http://schemas.openxmlformats.org/drawingml/2006/main" xmlns:r="http://schemas.openxmlformats.org/officeDocument/2006/relationships" xmlns:p="http://schemas.openxmlformats.org/presentationml/2006/main">
   <p:cSld>
     <p:bg>
@@ -3670,6 +3963,142 @@
     <p:extLst>
       <p:ext uri="{BB962C8B-B14F-4D97-AF65-F5344CB8AC3E}">
         <p14:creationId xmlns:p14="http://schemas.microsoft.com/office/powerpoint/2010/main" val="1793994499"/>
+      </p:ext>
+    </p:extLst>
+  </p:cSld>
+  <p:clrMapOvr>
+    <a:masterClrMapping/>
+  </p:clrMapOvr>
+</p:sld>
+</file>
+
+<file path=ppt/slides/slide8.xml><?xml version="1.0" encoding="utf-8"?>
+<p:sld xmlns:a="http://schemas.openxmlformats.org/drawingml/2006/main" xmlns:r="http://schemas.openxmlformats.org/officeDocument/2006/relationships" xmlns:p="http://schemas.openxmlformats.org/presentationml/2006/main">
+  <p:cSld>
+    <p:spTree>
+      <p:nvGrpSpPr>
+        <p:cNvPr id="1" name=""/>
+        <p:cNvGrpSpPr/>
+        <p:nvPr/>
+      </p:nvGrpSpPr>
+      <p:grpSpPr>
+        <a:xfrm>
+          <a:off x="0" y="0"/>
+          <a:ext cx="0" cy="0"/>
+          <a:chOff x="0" y="0"/>
+          <a:chExt cx="0" cy="0"/>
+        </a:xfrm>
+      </p:grpSpPr>
+      <p:sp>
+        <p:nvSpPr>
+          <p:cNvPr id="2" name="Title 1">
+            <a:extLst>
+              <a:ext uri="{FF2B5EF4-FFF2-40B4-BE49-F238E27FC236}">
+                <a16:creationId xmlns:a16="http://schemas.microsoft.com/office/drawing/2014/main" id="{FF65E1A8-624A-201C-7B77-2ACA62051C83}"/>
+              </a:ext>
+            </a:extLst>
+          </p:cNvPr>
+          <p:cNvSpPr>
+            <a:spLocks noGrp="1"/>
+          </p:cNvSpPr>
+          <p:nvPr>
+            <p:ph type="title"/>
+          </p:nvPr>
+        </p:nvSpPr>
+        <p:spPr/>
+        <p:txBody>
+          <a:bodyPr/>
+          <a:lstStyle/>
+          <a:p>
+            <a:r>
+              <a:rPr lang="en-GB" dirty="0"/>
+              <a:t>What Would This Look Like?</a:t>
+            </a:r>
+          </a:p>
+        </p:txBody>
+      </p:sp>
+      <p:sp>
+        <p:nvSpPr>
+          <p:cNvPr id="3" name="Content Placeholder 2">
+            <a:extLst>
+              <a:ext uri="{FF2B5EF4-FFF2-40B4-BE49-F238E27FC236}">
+                <a16:creationId xmlns:a16="http://schemas.microsoft.com/office/drawing/2014/main" id="{E7652786-E9AE-56EB-AE90-95A87636056F}"/>
+              </a:ext>
+            </a:extLst>
+          </p:cNvPr>
+          <p:cNvSpPr>
+            <a:spLocks noGrp="1"/>
+          </p:cNvSpPr>
+          <p:nvPr>
+            <p:ph idx="1"/>
+          </p:nvPr>
+        </p:nvSpPr>
+        <p:spPr/>
+        <p:txBody>
+          <a:bodyPr>
+            <a:normAutofit/>
+          </a:bodyPr>
+          <a:lstStyle/>
+          <a:p>
+            <a:r>
+              <a:rPr lang="en-GB"/>
+              <a:t>Take any </a:t>
+            </a:r>
+            <a:r>
+              <a:rPr lang="en-GB" dirty="0"/>
+              <a:t>Step from the Paper Model and think of it in FBP</a:t>
+            </a:r>
+          </a:p>
+          <a:p>
+            <a:pPr lvl="1"/>
+            <a:r>
+              <a:rPr lang="en-GB" dirty="0"/>
+              <a:t>What are the Information Packets, Nodes and Ports</a:t>
+            </a:r>
+          </a:p>
+          <a:p>
+            <a:pPr lvl="1"/>
+            <a:r>
+              <a:rPr lang="en-GB" dirty="0"/>
+              <a:t>Where do we have lookups?</a:t>
+            </a:r>
+          </a:p>
+          <a:p>
+            <a:pPr lvl="1"/>
+            <a:r>
+              <a:rPr lang="en-GB" dirty="0"/>
+              <a:t>Where do we need to store state?</a:t>
+            </a:r>
+          </a:p>
+          <a:p>
+            <a:r>
+              <a:rPr lang="en-GB" dirty="0"/>
+              <a:t>Think about what patterns of messaging we might have?</a:t>
+            </a:r>
+          </a:p>
+          <a:p>
+            <a:pPr lvl="1"/>
+            <a:r>
+              <a:rPr lang="en-GB" dirty="0"/>
+              <a:t>In-Out?</a:t>
+            </a:r>
+          </a:p>
+          <a:p>
+            <a:pPr lvl="1"/>
+            <a:r>
+              <a:rPr lang="en-GB" dirty="0"/>
+              <a:t>Out-Only?</a:t>
+            </a:r>
+          </a:p>
+          <a:p>
+            <a:endParaRPr lang="en-GB" dirty="0"/>
+          </a:p>
+        </p:txBody>
+      </p:sp>
+    </p:spTree>
+    <p:extLst>
+      <p:ext uri="{BB962C8B-B14F-4D97-AF65-F5344CB8AC3E}">
+        <p14:creationId xmlns:p14="http://schemas.microsoft.com/office/powerpoint/2010/main" val="39058674"/>
       </p:ext>
     </p:extLst>
   </p:cSld>

</xml_diff>